<commit_message>
update with morphose result ( part2)
</commit_message>
<xml_diff>
--- a/documentation/docTravail/seancesTravail/Role4All_use_case/Pimca_model.pptx
+++ b/documentation/docTravail/seancesTravail/Role4All_use_case/Pimca_model.pptx
@@ -288,7 +288,7 @@
           <a:p>
             <a:fld id="{F3B9D6BA-5416-495D-A565-B0C7BDE4C83D}" type="datetimeFigureOut">
               <a:rPr lang="fr-FR" smtClean="0"/>
-              <a:t>07/01/2016</a:t>
+              <a:t>23/06/2016</a:t>
             </a:fld>
             <a:endParaRPr lang="fr-FR"/>
           </a:p>
@@ -458,7 +458,7 @@
           <a:p>
             <a:fld id="{F3B9D6BA-5416-495D-A565-B0C7BDE4C83D}" type="datetimeFigureOut">
               <a:rPr lang="fr-FR" smtClean="0"/>
-              <a:t>07/01/2016</a:t>
+              <a:t>23/06/2016</a:t>
             </a:fld>
             <a:endParaRPr lang="fr-FR"/>
           </a:p>
@@ -638,7 +638,7 @@
           <a:p>
             <a:fld id="{F3B9D6BA-5416-495D-A565-B0C7BDE4C83D}" type="datetimeFigureOut">
               <a:rPr lang="fr-FR" smtClean="0"/>
-              <a:t>07/01/2016</a:t>
+              <a:t>23/06/2016</a:t>
             </a:fld>
             <a:endParaRPr lang="fr-FR"/>
           </a:p>
@@ -808,7 +808,7 @@
           <a:p>
             <a:fld id="{F3B9D6BA-5416-495D-A565-B0C7BDE4C83D}" type="datetimeFigureOut">
               <a:rPr lang="fr-FR" smtClean="0"/>
-              <a:t>07/01/2016</a:t>
+              <a:t>23/06/2016</a:t>
             </a:fld>
             <a:endParaRPr lang="fr-FR"/>
           </a:p>
@@ -1054,7 +1054,7 @@
           <a:p>
             <a:fld id="{F3B9D6BA-5416-495D-A565-B0C7BDE4C83D}" type="datetimeFigureOut">
               <a:rPr lang="fr-FR" smtClean="0"/>
-              <a:t>07/01/2016</a:t>
+              <a:t>23/06/2016</a:t>
             </a:fld>
             <a:endParaRPr lang="fr-FR"/>
           </a:p>
@@ -1342,7 +1342,7 @@
           <a:p>
             <a:fld id="{F3B9D6BA-5416-495D-A565-B0C7BDE4C83D}" type="datetimeFigureOut">
               <a:rPr lang="fr-FR" smtClean="0"/>
-              <a:t>07/01/2016</a:t>
+              <a:t>23/06/2016</a:t>
             </a:fld>
             <a:endParaRPr lang="fr-FR"/>
           </a:p>
@@ -1764,7 +1764,7 @@
           <a:p>
             <a:fld id="{F3B9D6BA-5416-495D-A565-B0C7BDE4C83D}" type="datetimeFigureOut">
               <a:rPr lang="fr-FR" smtClean="0"/>
-              <a:t>07/01/2016</a:t>
+              <a:t>23/06/2016</a:t>
             </a:fld>
             <a:endParaRPr lang="fr-FR"/>
           </a:p>
@@ -1882,7 +1882,7 @@
           <a:p>
             <a:fld id="{F3B9D6BA-5416-495D-A565-B0C7BDE4C83D}" type="datetimeFigureOut">
               <a:rPr lang="fr-FR" smtClean="0"/>
-              <a:t>07/01/2016</a:t>
+              <a:t>23/06/2016</a:t>
             </a:fld>
             <a:endParaRPr lang="fr-FR"/>
           </a:p>
@@ -1977,7 +1977,7 @@
           <a:p>
             <a:fld id="{F3B9D6BA-5416-495D-A565-B0C7BDE4C83D}" type="datetimeFigureOut">
               <a:rPr lang="fr-FR" smtClean="0"/>
-              <a:t>07/01/2016</a:t>
+              <a:t>23/06/2016</a:t>
             </a:fld>
             <a:endParaRPr lang="fr-FR"/>
           </a:p>
@@ -2254,7 +2254,7 @@
           <a:p>
             <a:fld id="{F3B9D6BA-5416-495D-A565-B0C7BDE4C83D}" type="datetimeFigureOut">
               <a:rPr lang="fr-FR" smtClean="0"/>
-              <a:t>07/01/2016</a:t>
+              <a:t>23/06/2016</a:t>
             </a:fld>
             <a:endParaRPr lang="fr-FR"/>
           </a:p>
@@ -2507,7 +2507,7 @@
           <a:p>
             <a:fld id="{F3B9D6BA-5416-495D-A565-B0C7BDE4C83D}" type="datetimeFigureOut">
               <a:rPr lang="fr-FR" smtClean="0"/>
-              <a:t>07/01/2016</a:t>
+              <a:t>23/06/2016</a:t>
             </a:fld>
             <a:endParaRPr lang="fr-FR"/>
           </a:p>
@@ -2720,7 +2720,7 @@
           <a:p>
             <a:fld id="{F3B9D6BA-5416-495D-A565-B0C7BDE4C83D}" type="datetimeFigureOut">
               <a:rPr lang="fr-FR" smtClean="0"/>
-              <a:t>07/01/2016</a:t>
+              <a:t>23/06/2016</a:t>
             </a:fld>
             <a:endParaRPr lang="fr-FR"/>
           </a:p>
@@ -3702,8 +3702,12 @@
             <a:lstStyle/>
             <a:p>
               <a:r>
+                <a:rPr lang="fr-FR" sz="1600" dirty="0" err="1" smtClean="0"/>
+                <a:t>Hypothetical</a:t>
+              </a:r>
+              <a:r>
                 <a:rPr lang="fr-FR" sz="1600" dirty="0" smtClean="0"/>
-                <a:t>Hypothetical system</a:t>
+                <a:t> system</a:t>
               </a:r>
               <a:endParaRPr lang="fr-FR" sz="1600" dirty="0"/>
             </a:p>

</xml_diff>